<commit_message>
anpasssung der Zwischenstand Datei(svm)
</commit_message>
<xml_diff>
--- a/CNN/Zwischenstand.pptx
+++ b/CNN/Zwischenstand.pptx
@@ -7,6 +7,7 @@
   <p:sldIdLst>
     <p:sldId id="256" r:id="rId2"/>
     <p:sldId id="257" r:id="rId3"/>
+    <p:sldId id="258" r:id="rId4"/>
   </p:sldIdLst>
   <p:sldSz cx="12192000" cy="6858000"/>
   <p:notesSz cx="6858000" cy="9144000"/>
@@ -105,7 +106,20 @@
       </a:defRPr>
     </a:lvl9pPr>
   </p:defaultTextStyle>
+  <p:extLst>
+    <p:ext uri="{EFAFB233-063F-42B5-8137-9DF3F51BA10A}">
+      <p15:sldGuideLst xmlns:p15="http://schemas.microsoft.com/office/powerpoint/2012/main"/>
+    </p:ext>
+  </p:extLst>
 </p:presentation>
+</file>
+
+<file path=ppt/revisionInfo.xml><?xml version="1.0" encoding="utf-8"?>
+<p1510:revInfo xmlns:a="http://schemas.openxmlformats.org/drawingml/2006/main" xmlns:r="http://schemas.openxmlformats.org/officeDocument/2006/relationships" xmlns:p1510="http://schemas.microsoft.com/office/powerpoint/2015/10/main">
+  <p1510:revLst>
+    <p1510:client id="{777F3D57-8E87-883B-CE32-9D5A2A99DD83}" v="112" dt="2024-11-20T00:09:18.469"/>
+  </p1510:revLst>
+</p1510:revInfo>
 </file>
 
 <file path=ppt/slideLayouts/slideLayout1.xml><?xml version="1.0" encoding="utf-8"?>
@@ -3488,7 +3502,14 @@
           <a:lstStyle/>
           <a:p>
             <a:r>
+              <a:rPr lang="de-DE"/>
+              <a:t>          CNN</a:t>
+            </a:r>
+            <a:br>
               <a:rPr lang="de-DE" dirty="0"/>
+            </a:br>
+            <a:r>
+              <a:rPr lang="de-DE"/>
               <a:t>Werteres Vorgehen</a:t>
             </a:r>
           </a:p>
@@ -3579,6 +3600,159 @@
     <p:extLst>
       <p:ext uri="{BB962C8B-B14F-4D97-AF65-F5344CB8AC3E}">
         <p14:creationId xmlns:p14="http://schemas.microsoft.com/office/powerpoint/2010/main" val="3488226294"/>
+      </p:ext>
+    </p:extLst>
+  </p:cSld>
+  <p:clrMapOvr>
+    <a:masterClrMapping/>
+  </p:clrMapOvr>
+</p:sld>
+</file>
+
+<file path=ppt/slides/slide3.xml><?xml version="1.0" encoding="utf-8"?>
+<p:sld xmlns:a="http://schemas.openxmlformats.org/drawingml/2006/main" xmlns:r="http://schemas.openxmlformats.org/officeDocument/2006/relationships" xmlns:p="http://schemas.openxmlformats.org/presentationml/2006/main">
+  <p:cSld>
+    <p:spTree>
+      <p:nvGrpSpPr>
+        <p:cNvPr id="1" name=""/>
+        <p:cNvGrpSpPr/>
+        <p:nvPr/>
+      </p:nvGrpSpPr>
+      <p:grpSpPr>
+        <a:xfrm>
+          <a:off x="0" y="0"/>
+          <a:ext cx="0" cy="0"/>
+          <a:chOff x="0" y="0"/>
+          <a:chExt cx="0" cy="0"/>
+        </a:xfrm>
+      </p:grpSpPr>
+      <p:sp>
+        <p:nvSpPr>
+          <p:cNvPr id="6" name="Titel 5">
+            <a:extLst>
+              <a:ext uri="{FF2B5EF4-FFF2-40B4-BE49-F238E27FC236}">
+                <a16:creationId xmlns:a16="http://schemas.microsoft.com/office/drawing/2014/main" id="{E7CE44EC-EFDF-E76F-0F36-626C7CE572AF}"/>
+              </a:ext>
+            </a:extLst>
+          </p:cNvPr>
+          <p:cNvSpPr>
+            <a:spLocks noGrp="1"/>
+          </p:cNvSpPr>
+          <p:nvPr>
+            <p:ph type="title"/>
+          </p:nvPr>
+        </p:nvSpPr>
+        <p:spPr/>
+        <p:txBody>
+          <a:bodyPr/>
+          <a:lstStyle/>
+          <a:p>
+            <a:r>
+              <a:rPr lang="de-DE"/>
+              <a:t>            SVM</a:t>
+            </a:r>
+            <a:br>
+              <a:rPr lang="de-DE" dirty="0"/>
+            </a:br>
+            <a:r>
+              <a:rPr lang="de-DE" dirty="0"/>
+              <a:t>Werteres Vorgehen</a:t>
+            </a:r>
+          </a:p>
+        </p:txBody>
+      </p:sp>
+      <p:sp>
+        <p:nvSpPr>
+          <p:cNvPr id="8" name="Textplatzhalter 7">
+            <a:extLst>
+              <a:ext uri="{FF2B5EF4-FFF2-40B4-BE49-F238E27FC236}">
+                <a16:creationId xmlns:a16="http://schemas.microsoft.com/office/drawing/2014/main" id="{3429C638-EC76-F99B-3312-996E06E09EC8}"/>
+              </a:ext>
+            </a:extLst>
+          </p:cNvPr>
+          <p:cNvSpPr>
+            <a:spLocks noGrp="1"/>
+          </p:cNvSpPr>
+          <p:nvPr>
+            <p:ph type="body" sz="half" idx="2"/>
+          </p:nvPr>
+        </p:nvSpPr>
+        <p:spPr/>
+        <p:txBody>
+          <a:bodyPr vert="horz" lIns="91440" tIns="45720" rIns="91440" bIns="45720" rtlCol="0" anchor="t">
+            <a:normAutofit/>
+          </a:bodyPr>
+          <a:lstStyle/>
+          <a:p>
+            <a:pPr marL="285750" indent="-285750">
+              <a:buFontTx/>
+              <a:buChar char="-"/>
+            </a:pPr>
+            <a:r>
+              <a:rPr lang="de-DE" dirty="0"/>
+              <a:t>Testdaten erweitern</a:t>
+            </a:r>
+          </a:p>
+          <a:p>
+            <a:pPr marL="285750" indent="-285750">
+              <a:buFontTx/>
+              <a:buChar char="-"/>
+            </a:pPr>
+            <a:r>
+              <a:rPr lang="de-DE" dirty="0"/>
+              <a:t>Modell weiter optimieren (weniger Fehler)</a:t>
+            </a:r>
+          </a:p>
+          <a:p>
+            <a:pPr marL="285750" indent="-285750">
+              <a:buFontTx/>
+              <a:buChar char="-"/>
+            </a:pPr>
+            <a:r>
+              <a:rPr lang="de-DE" dirty="0"/>
+              <a:t>Weitere Anpassungen</a:t>
+            </a:r>
+            <a:r>
+              <a:rPr lang="de-DE"/>
+              <a:t> um möglicherweise bessere Ergebnisse zu erhalten</a:t>
+            </a:r>
+            <a:endParaRPr lang="de-DE" dirty="0"/>
+          </a:p>
+        </p:txBody>
+      </p:sp>
+      <p:pic>
+        <p:nvPicPr>
+          <p:cNvPr id="11" name="Inhaltsplatzhalter 10" descr="Ein Bild, das Text, Screenshot, Software, Schrift enthält.&#10;&#10;Beschreibung automatisch generiert.">
+            <a:extLst>
+              <a:ext uri="{FF2B5EF4-FFF2-40B4-BE49-F238E27FC236}">
+                <a16:creationId xmlns:a16="http://schemas.microsoft.com/office/drawing/2014/main" id="{E7395669-2059-50E0-7E41-D58FD433D74A}"/>
+              </a:ext>
+            </a:extLst>
+          </p:cNvPr>
+          <p:cNvPicPr>
+            <a:picLocks noGrp="1" noChangeAspect="1"/>
+          </p:cNvPicPr>
+          <p:nvPr>
+            <p:ph idx="1"/>
+          </p:nvPr>
+        </p:nvPicPr>
+        <p:blipFill>
+          <a:blip r:embed="rId2"/>
+          <a:stretch>
+            <a:fillRect/>
+          </a:stretch>
+        </p:blipFill>
+        <p:spPr>
+          <a:xfrm>
+            <a:off x="5221288" y="1263284"/>
+            <a:ext cx="6731000" cy="3931138"/>
+          </a:xfrm>
+        </p:spPr>
+      </p:pic>
+    </p:spTree>
+    <p:extLst>
+      <p:ext uri="{BB962C8B-B14F-4D97-AF65-F5344CB8AC3E}">
+        <p14:creationId xmlns:p14="http://schemas.microsoft.com/office/powerpoint/2010/main" val="1560300825"/>
       </p:ext>
     </p:extLst>
   </p:cSld>

</xml_diff>